<commit_message>
Correção das aulas 1 e 5
</commit_message>
<xml_diff>
--- a/Módulo 01 - Introdução ao Flutter/Módulo I - Introdução ao Flutter.pptx
+++ b/Módulo 01 - Introdução ao Flutter/Módulo I - Introdução ao Flutter.pptx
@@ -8,33 +8,35 @@
     <p:sldId id="256" r:id="rId2"/>
     <p:sldId id="257" r:id="rId3"/>
     <p:sldId id="258" r:id="rId4"/>
-    <p:sldId id="266" r:id="rId5"/>
-    <p:sldId id="264" r:id="rId6"/>
-    <p:sldId id="265" r:id="rId7"/>
-    <p:sldId id="267" r:id="rId8"/>
+    <p:sldId id="268" r:id="rId5"/>
+    <p:sldId id="266" r:id="rId6"/>
+    <p:sldId id="264" r:id="rId7"/>
+    <p:sldId id="265" r:id="rId8"/>
+    <p:sldId id="269" r:id="rId9"/>
+    <p:sldId id="267" r:id="rId10"/>
   </p:sldIdLst>
   <p:sldSz cx="18288000" cy="10287000"/>
   <p:notesSz cx="6858000" cy="9144000"/>
   <p:embeddedFontLst>
     <p:embeddedFont>
       <p:font typeface="Lato" panose="020F0502020204030203" pitchFamily="34" charset="0"/>
-      <p:regular r:id="rId9"/>
-      <p:bold r:id="rId10"/>
-      <p:italic r:id="rId11"/>
-      <p:boldItalic r:id="rId12"/>
+      <p:regular r:id="rId11"/>
+      <p:bold r:id="rId12"/>
+      <p:italic r:id="rId13"/>
+      <p:boldItalic r:id="rId14"/>
     </p:embeddedFont>
     <p:embeddedFont>
       <p:font typeface="Lato Bold" panose="020F0502020204030203" pitchFamily="34" charset="0"/>
-      <p:regular r:id="rId13"/>
-      <p:bold r:id="rId14"/>
+      <p:regular r:id="rId15"/>
+      <p:bold r:id="rId16"/>
     </p:embeddedFont>
     <p:embeddedFont>
       <p:font typeface="Poppins Bold" panose="00000800000000000000" pitchFamily="2" charset="0"/>
-      <p:bold r:id="rId15"/>
+      <p:bold r:id="rId17"/>
     </p:embeddedFont>
     <p:embeddedFont>
       <p:font typeface="Poppins Ultra-Bold" panose="020B0604020202020204" charset="0"/>
-      <p:regular r:id="rId16"/>
+      <p:regular r:id="rId18"/>
     </p:embeddedFont>
   </p:embeddedFontLst>
   <p:defaultTextStyle>
@@ -154,8 +156,7 @@
 <file path=ppt/revisionInfo.xml><?xml version="1.0" encoding="utf-8"?>
 <p1510:revInfo xmlns:a="http://schemas.openxmlformats.org/drawingml/2006/main" xmlns:r="http://schemas.openxmlformats.org/officeDocument/2006/relationships" xmlns:p1510="http://schemas.microsoft.com/office/powerpoint/2015/10/main">
   <p1510:revLst>
-    <p1510:client id="{2A9CBF01-8692-C0EA-21CD-C30659F09720}" v="446" dt="2024-11-18T23:04:09.432"/>
-    <p1510:client id="{67BA14AF-57F4-BDFA-9EDE-0888976205DF}" v="95" dt="2024-11-18T22:45:13.714"/>
+    <p1510:client id="{AA3BCD59-7516-FFE3-283F-06555D4FF11A}" v="381" dt="2024-12-06T20:04:25.886"/>
   </p1510:revLst>
 </p1510:revInfo>
 </file>
@@ -340,7 +341,7 @@
             <a:fld id="{1D8BD707-D9CF-40AE-B4C6-C98DA3205C09}" type="datetimeFigureOut">
               <a:rPr lang="en-US" smtClean="0"/>
               <a:pPr/>
-              <a:t>11/18/2024</a:t>
+              <a:t>12/6/2024</a:t>
             </a:fld>
             <a:endParaRPr lang="en-US"/>
           </a:p>
@@ -505,7 +506,7 @@
             <a:fld id="{1D8BD707-D9CF-40AE-B4C6-C98DA3205C09}" type="datetimeFigureOut">
               <a:rPr lang="en-US" smtClean="0"/>
               <a:pPr/>
-              <a:t>11/18/2024</a:t>
+              <a:t>12/6/2024</a:t>
             </a:fld>
             <a:endParaRPr lang="en-US"/>
           </a:p>
@@ -680,7 +681,7 @@
             <a:fld id="{1D8BD707-D9CF-40AE-B4C6-C98DA3205C09}" type="datetimeFigureOut">
               <a:rPr lang="en-US" smtClean="0"/>
               <a:pPr/>
-              <a:t>11/18/2024</a:t>
+              <a:t>12/6/2024</a:t>
             </a:fld>
             <a:endParaRPr lang="en-US"/>
           </a:p>
@@ -845,7 +846,7 @@
             <a:fld id="{1D8BD707-D9CF-40AE-B4C6-C98DA3205C09}" type="datetimeFigureOut">
               <a:rPr lang="en-US" smtClean="0"/>
               <a:pPr/>
-              <a:t>11/18/2024</a:t>
+              <a:t>12/6/2024</a:t>
             </a:fld>
             <a:endParaRPr lang="en-US"/>
           </a:p>
@@ -1087,7 +1088,7 @@
             <a:fld id="{1D8BD707-D9CF-40AE-B4C6-C98DA3205C09}" type="datetimeFigureOut">
               <a:rPr lang="en-US" smtClean="0"/>
               <a:pPr/>
-              <a:t>11/18/2024</a:t>
+              <a:t>12/6/2024</a:t>
             </a:fld>
             <a:endParaRPr lang="en-US"/>
           </a:p>
@@ -1369,7 +1370,7 @@
             <a:fld id="{1D8BD707-D9CF-40AE-B4C6-C98DA3205C09}" type="datetimeFigureOut">
               <a:rPr lang="en-US" smtClean="0"/>
               <a:pPr/>
-              <a:t>11/18/2024</a:t>
+              <a:t>12/6/2024</a:t>
             </a:fld>
             <a:endParaRPr lang="en-US"/>
           </a:p>
@@ -1785,7 +1786,7 @@
             <a:fld id="{1D8BD707-D9CF-40AE-B4C6-C98DA3205C09}" type="datetimeFigureOut">
               <a:rPr lang="en-US" smtClean="0"/>
               <a:pPr/>
-              <a:t>11/18/2024</a:t>
+              <a:t>12/6/2024</a:t>
             </a:fld>
             <a:endParaRPr lang="en-US"/>
           </a:p>
@@ -1899,7 +1900,7 @@
             <a:fld id="{1D8BD707-D9CF-40AE-B4C6-C98DA3205C09}" type="datetimeFigureOut">
               <a:rPr lang="en-US" smtClean="0"/>
               <a:pPr/>
-              <a:t>11/18/2024</a:t>
+              <a:t>12/6/2024</a:t>
             </a:fld>
             <a:endParaRPr lang="en-US"/>
           </a:p>
@@ -1991,7 +1992,7 @@
             <a:fld id="{1D8BD707-D9CF-40AE-B4C6-C98DA3205C09}" type="datetimeFigureOut">
               <a:rPr lang="en-US" smtClean="0"/>
               <a:pPr/>
-              <a:t>11/18/2024</a:t>
+              <a:t>12/6/2024</a:t>
             </a:fld>
             <a:endParaRPr lang="en-US"/>
           </a:p>
@@ -2263,7 +2264,7 @@
             <a:fld id="{1D8BD707-D9CF-40AE-B4C6-C98DA3205C09}" type="datetimeFigureOut">
               <a:rPr lang="en-US" smtClean="0"/>
               <a:pPr/>
-              <a:t>11/18/2024</a:t>
+              <a:t>12/6/2024</a:t>
             </a:fld>
             <a:endParaRPr lang="en-US"/>
           </a:p>
@@ -2512,7 +2513,7 @@
             <a:fld id="{1D8BD707-D9CF-40AE-B4C6-C98DA3205C09}" type="datetimeFigureOut">
               <a:rPr lang="en-US" smtClean="0"/>
               <a:pPr/>
-              <a:t>11/18/2024</a:t>
+              <a:t>12/6/2024</a:t>
             </a:fld>
             <a:endParaRPr lang="en-US"/>
           </a:p>
@@ -2720,7 +2721,7 @@
             <a:fld id="{1D8BD707-D9CF-40AE-B4C6-C98DA3205C09}" type="datetimeFigureOut">
               <a:rPr lang="en-US" smtClean="0"/>
               <a:pPr/>
-              <a:t>11/18/2024</a:t>
+              <a:t>12/6/2024</a:t>
             </a:fld>
             <a:endParaRPr lang="en-US"/>
           </a:p>
@@ -4212,8 +4213,8 @@
         </p:nvSpPr>
         <p:spPr>
           <a:xfrm>
-            <a:off x="2140667" y="4548976"/>
-            <a:ext cx="9377199" cy="628377"/>
+            <a:off x="2125010" y="4533319"/>
+            <a:ext cx="9549431" cy="1256754"/>
           </a:xfrm>
           <a:prstGeom prst="rect">
             <a:avLst/>
@@ -4231,12 +4232,176 @@
               </a:lnSpc>
             </a:pPr>
             <a:r>
-              <a:rPr lang="en-US" sz="4500" spc="350" err="1">
+              <a:rPr lang="en-US" sz="4500" spc="350" dirty="0">
                 <a:solidFill>
                   <a:srgbClr val="2B4A9D"/>
                 </a:solidFill>
                 <a:latin typeface="Lato Bold"/>
               </a:rPr>
+              <a:t>Principal </a:t>
+            </a:r>
+            <a:r>
+              <a:rPr lang="en-US" sz="4500" spc="350" dirty="0" err="1">
+                <a:solidFill>
+                  <a:srgbClr val="2B4A9D"/>
+                </a:solidFill>
+                <a:latin typeface="Lato Bold"/>
+              </a:rPr>
+              <a:t>ambiente</a:t>
+            </a:r>
+            <a:r>
+              <a:rPr lang="en-US" sz="4500" spc="350" dirty="0">
+                <a:solidFill>
+                  <a:srgbClr val="2B4A9D"/>
+                </a:solidFill>
+                <a:latin typeface="Lato Bold"/>
+              </a:rPr>
+              <a:t> de </a:t>
+            </a:r>
+            <a:r>
+              <a:rPr lang="en-US" sz="4500" spc="350" dirty="0" err="1">
+                <a:solidFill>
+                  <a:srgbClr val="2B4A9D"/>
+                </a:solidFill>
+                <a:latin typeface="Lato Bold"/>
+              </a:rPr>
+              <a:t>desenvolvimento</a:t>
+            </a:r>
+            <a:endParaRPr lang="pt-BR" sz="4500" dirty="0" err="1"/>
+          </a:p>
+        </p:txBody>
+      </p:sp>
+      <p:grpSp>
+        <p:nvGrpSpPr>
+          <p:cNvPr id="19" name="Group 17">
+            <a:extLst>
+              <a:ext uri="{FF2B5EF4-FFF2-40B4-BE49-F238E27FC236}">
+                <a16:creationId xmlns:a16="http://schemas.microsoft.com/office/drawing/2014/main" id="{DD8931C6-9EF9-4C0B-DF10-6F6B47486E3E}"/>
+              </a:ext>
+            </a:extLst>
+          </p:cNvPr>
+          <p:cNvGrpSpPr/>
+          <p:nvPr/>
+        </p:nvGrpSpPr>
+        <p:grpSpPr>
+          <a:xfrm rot="16200000">
+            <a:off x="568705" y="5638023"/>
+            <a:ext cx="829062" cy="1966473"/>
+            <a:chOff x="0" y="0"/>
+            <a:chExt cx="2353310" cy="5581882"/>
+          </a:xfrm>
+        </p:grpSpPr>
+        <p:sp>
+          <p:nvSpPr>
+            <p:cNvPr id="20" name="Freeform 18">
+              <a:extLst>
+                <a:ext uri="{FF2B5EF4-FFF2-40B4-BE49-F238E27FC236}">
+                  <a16:creationId xmlns:a16="http://schemas.microsoft.com/office/drawing/2014/main" id="{25A44E37-4B4D-1C57-38D6-16234B2A8379}"/>
+                </a:ext>
+              </a:extLst>
+            </p:cNvPr>
+            <p:cNvSpPr/>
+            <p:nvPr/>
+          </p:nvSpPr>
+          <p:spPr>
+            <a:xfrm>
+              <a:off x="0" y="0"/>
+              <a:ext cx="2353310" cy="5581882"/>
+            </a:xfrm>
+            <a:custGeom>
+              <a:avLst/>
+              <a:gdLst/>
+              <a:ahLst/>
+              <a:cxnLst/>
+              <a:rect l="l" t="t" r="r" b="b"/>
+              <a:pathLst>
+                <a:path w="2353310" h="5581882">
+                  <a:moveTo>
+                    <a:pt x="784860" y="5514572"/>
+                  </a:moveTo>
+                  <a:cubicBezTo>
+                    <a:pt x="905510" y="5555212"/>
+                    <a:pt x="1042670" y="5581882"/>
+                    <a:pt x="1177290" y="5581882"/>
+                  </a:cubicBezTo>
+                  <a:cubicBezTo>
+                    <a:pt x="1311910" y="5581882"/>
+                    <a:pt x="1441450" y="5559022"/>
+                    <a:pt x="1560830" y="5518382"/>
+                  </a:cubicBezTo>
+                  <a:cubicBezTo>
+                    <a:pt x="1563370" y="5517112"/>
+                    <a:pt x="1565910" y="5517112"/>
+                    <a:pt x="1568450" y="5515842"/>
+                  </a:cubicBezTo>
+                  <a:cubicBezTo>
+                    <a:pt x="2016760" y="5353282"/>
+                    <a:pt x="2346960" y="4924022"/>
+                    <a:pt x="2353310" y="4414024"/>
+                  </a:cubicBezTo>
+                  <a:lnTo>
+                    <a:pt x="2353310" y="0"/>
+                  </a:lnTo>
+                  <a:lnTo>
+                    <a:pt x="0" y="0"/>
+                  </a:lnTo>
+                  <a:lnTo>
+                    <a:pt x="0" y="4410668"/>
+                  </a:lnTo>
+                  <a:cubicBezTo>
+                    <a:pt x="6350" y="4926562"/>
+                    <a:pt x="331470" y="5355822"/>
+                    <a:pt x="784860" y="5514572"/>
+                  </a:cubicBezTo>
+                  <a:close/>
+                </a:path>
+              </a:pathLst>
+            </a:custGeom>
+            <a:solidFill>
+              <a:srgbClr val="2B4A9D"/>
+            </a:solidFill>
+          </p:spPr>
+        </p:sp>
+      </p:grpSp>
+      <p:sp>
+        <p:nvSpPr>
+          <p:cNvPr id="21" name="TextBox 24">
+            <a:extLst>
+              <a:ext uri="{FF2B5EF4-FFF2-40B4-BE49-F238E27FC236}">
+                <a16:creationId xmlns:a16="http://schemas.microsoft.com/office/drawing/2014/main" id="{8DB2D00E-A798-CE1E-4D15-9A32C249B253}"/>
+              </a:ext>
+            </a:extLst>
+          </p:cNvPr>
+          <p:cNvSpPr txBox="1"/>
+          <p:nvPr/>
+        </p:nvSpPr>
+        <p:spPr>
+          <a:xfrm>
+            <a:off x="2140667" y="6302619"/>
+            <a:ext cx="9549431" cy="1256754"/>
+          </a:xfrm>
+          <a:prstGeom prst="rect">
+            <a:avLst/>
+          </a:prstGeom>
+        </p:spPr>
+        <p:txBody>
+          <a:bodyPr wrap="square" lIns="0" tIns="0" rIns="0" bIns="0" rtlCol="0" anchor="t">
+            <a:spAutoFit/>
+          </a:bodyPr>
+          <a:lstStyle/>
+          <a:p>
+            <a:pPr>
+              <a:lnSpc>
+                <a:spcPts val="4900"/>
+              </a:lnSpc>
+            </a:pPr>
+            <a:r>
+              <a:rPr lang="en-US" sz="4500" spc="350" dirty="0" err="1">
+                <a:solidFill>
+                  <a:srgbClr val="2B4A9D"/>
+                </a:solidFill>
+                <a:latin typeface="Lato Bold"/>
+              </a:rPr>
               <a:t>Ambiente</a:t>
             </a:r>
             <a:r>
@@ -4249,7 +4414,7 @@
               <a:t> de </a:t>
             </a:r>
             <a:r>
-              <a:rPr lang="en-US" sz="4500" spc="350" err="1">
+              <a:rPr lang="en-US" sz="4500" spc="350" dirty="0" err="1">
                 <a:solidFill>
                   <a:srgbClr val="2B4A9D"/>
                 </a:solidFill>
@@ -4257,7 +4422,68 @@
               </a:rPr>
               <a:t>desenvolvimento</a:t>
             </a:r>
-            <a:endParaRPr lang="pt-BR" sz="4500" err="1"/>
+            <a:r>
+              <a:rPr lang="en-US" sz="4500" spc="350" dirty="0">
+                <a:solidFill>
+                  <a:srgbClr val="2B4A9D"/>
+                </a:solidFill>
+                <a:latin typeface="Lato Bold"/>
+              </a:rPr>
+              <a:t> </a:t>
+            </a:r>
+            <a:r>
+              <a:rPr lang="en-US" sz="4500" spc="350" dirty="0" err="1">
+                <a:solidFill>
+                  <a:srgbClr val="2B4A9D"/>
+                </a:solidFill>
+                <a:latin typeface="Lato Bold"/>
+              </a:rPr>
+              <a:t>utilizado</a:t>
+            </a:r>
+            <a:r>
+              <a:rPr lang="en-US" sz="4500" spc="350" dirty="0">
+                <a:solidFill>
+                  <a:srgbClr val="2B4A9D"/>
+                </a:solidFill>
+                <a:latin typeface="Lato Bold"/>
+              </a:rPr>
+              <a:t> </a:t>
+            </a:r>
+            <a:r>
+              <a:rPr lang="en-US" sz="4500" spc="350" dirty="0" err="1">
+                <a:solidFill>
+                  <a:srgbClr val="2B4A9D"/>
+                </a:solidFill>
+                <a:latin typeface="Lato Bold"/>
+              </a:rPr>
+              <a:t>neste</a:t>
+            </a:r>
+            <a:r>
+              <a:rPr lang="en-US" sz="4500" spc="350" dirty="0">
+                <a:solidFill>
+                  <a:srgbClr val="2B4A9D"/>
+                </a:solidFill>
+                <a:latin typeface="Lato Bold"/>
+              </a:rPr>
+              <a:t> </a:t>
+            </a:r>
+            <a:r>
+              <a:rPr lang="en-US" sz="4500" spc="350" dirty="0" err="1">
+                <a:solidFill>
+                  <a:srgbClr val="2B4A9D"/>
+                </a:solidFill>
+                <a:latin typeface="Lato Bold"/>
+              </a:rPr>
+              <a:t>curso</a:t>
+            </a:r>
+            <a:endParaRPr lang="en-US" sz="4500" spc="350" err="1">
+              <a:solidFill>
+                <a:srgbClr val="2B4A9D"/>
+              </a:solidFill>
+              <a:latin typeface="Lato Bold"/>
+              <a:ea typeface="Lato Bold"/>
+              <a:cs typeface="Lato Bold"/>
+            </a:endParaRPr>
           </a:p>
         </p:txBody>
       </p:sp>
@@ -5089,6 +5315,283 @@
           <a:chExt cx="0" cy="0"/>
         </a:xfrm>
       </p:grpSpPr>
+      <p:grpSp>
+        <p:nvGrpSpPr>
+          <p:cNvPr id="2" name="Group 2"/>
+          <p:cNvGrpSpPr/>
+          <p:nvPr/>
+        </p:nvGrpSpPr>
+        <p:grpSpPr>
+          <a:xfrm rot="-2700000">
+            <a:off x="15004959" y="1860459"/>
+            <a:ext cx="6566081" cy="6566081"/>
+            <a:chOff x="0" y="0"/>
+            <a:chExt cx="1913890" cy="1913890"/>
+          </a:xfrm>
+        </p:grpSpPr>
+        <p:sp>
+          <p:nvSpPr>
+            <p:cNvPr id="3" name="Freeform 3"/>
+            <p:cNvSpPr/>
+            <p:nvPr/>
+          </p:nvSpPr>
+          <p:spPr>
+            <a:xfrm>
+              <a:off x="0" y="0"/>
+              <a:ext cx="1913890" cy="1913890"/>
+            </a:xfrm>
+            <a:custGeom>
+              <a:avLst/>
+              <a:gdLst/>
+              <a:ahLst/>
+              <a:cxnLst/>
+              <a:rect l="l" t="t" r="r" b="b"/>
+              <a:pathLst>
+                <a:path w="1913890" h="1913890">
+                  <a:moveTo>
+                    <a:pt x="0" y="0"/>
+                  </a:moveTo>
+                  <a:lnTo>
+                    <a:pt x="1913890" y="0"/>
+                  </a:lnTo>
+                  <a:lnTo>
+                    <a:pt x="1913890" y="1913890"/>
+                  </a:lnTo>
+                  <a:lnTo>
+                    <a:pt x="0" y="1913890"/>
+                  </a:lnTo>
+                  <a:close/>
+                </a:path>
+              </a:pathLst>
+            </a:custGeom>
+            <a:solidFill>
+              <a:srgbClr val="5271FF"/>
+            </a:solidFill>
+          </p:spPr>
+        </p:sp>
+      </p:grpSp>
+      <p:grpSp>
+        <p:nvGrpSpPr>
+          <p:cNvPr id="4" name="Group 4"/>
+          <p:cNvGrpSpPr/>
+          <p:nvPr/>
+        </p:nvGrpSpPr>
+        <p:grpSpPr>
+          <a:xfrm rot="2700000">
+            <a:off x="15361560" y="2217060"/>
+            <a:ext cx="5852880" cy="5852880"/>
+            <a:chOff x="0" y="0"/>
+            <a:chExt cx="1913890" cy="1913890"/>
+          </a:xfrm>
+        </p:grpSpPr>
+        <p:sp>
+          <p:nvSpPr>
+            <p:cNvPr id="5" name="Freeform 5"/>
+            <p:cNvSpPr/>
+            <p:nvPr/>
+          </p:nvSpPr>
+          <p:spPr>
+            <a:xfrm>
+              <a:off x="0" y="0"/>
+              <a:ext cx="1913890" cy="1913890"/>
+            </a:xfrm>
+            <a:custGeom>
+              <a:avLst/>
+              <a:gdLst/>
+              <a:ahLst/>
+              <a:cxnLst/>
+              <a:rect l="l" t="t" r="r" b="b"/>
+              <a:pathLst>
+                <a:path w="1913890" h="1913890">
+                  <a:moveTo>
+                    <a:pt x="0" y="0"/>
+                  </a:moveTo>
+                  <a:lnTo>
+                    <a:pt x="0" y="1913890"/>
+                  </a:lnTo>
+                  <a:lnTo>
+                    <a:pt x="1913890" y="1913890"/>
+                  </a:lnTo>
+                  <a:lnTo>
+                    <a:pt x="1913890" y="0"/>
+                  </a:lnTo>
+                  <a:lnTo>
+                    <a:pt x="0" y="0"/>
+                  </a:lnTo>
+                  <a:close/>
+                  <a:moveTo>
+                    <a:pt x="1852930" y="1852930"/>
+                  </a:moveTo>
+                  <a:lnTo>
+                    <a:pt x="59690" y="1852930"/>
+                  </a:lnTo>
+                  <a:lnTo>
+                    <a:pt x="59690" y="59690"/>
+                  </a:lnTo>
+                  <a:lnTo>
+                    <a:pt x="1852930" y="59690"/>
+                  </a:lnTo>
+                  <a:lnTo>
+                    <a:pt x="1852930" y="1852930"/>
+                  </a:lnTo>
+                  <a:close/>
+                </a:path>
+              </a:pathLst>
+            </a:custGeom>
+            <a:solidFill>
+              <a:srgbClr val="FFFFFF"/>
+            </a:solidFill>
+          </p:spPr>
+        </p:sp>
+      </p:grpSp>
+      <p:grpSp>
+        <p:nvGrpSpPr>
+          <p:cNvPr id="6" name="Group 6"/>
+          <p:cNvGrpSpPr/>
+          <p:nvPr/>
+        </p:nvGrpSpPr>
+        <p:grpSpPr>
+          <a:xfrm rot="2700000">
+            <a:off x="11143419" y="8043030"/>
+            <a:ext cx="6164339" cy="6164339"/>
+            <a:chOff x="0" y="0"/>
+            <a:chExt cx="1913890" cy="1913890"/>
+          </a:xfrm>
+        </p:grpSpPr>
+        <p:sp>
+          <p:nvSpPr>
+            <p:cNvPr id="7" name="Freeform 7"/>
+            <p:cNvSpPr/>
+            <p:nvPr/>
+          </p:nvSpPr>
+          <p:spPr>
+            <a:xfrm>
+              <a:off x="0" y="0"/>
+              <a:ext cx="1913890" cy="1913890"/>
+            </a:xfrm>
+            <a:custGeom>
+              <a:avLst/>
+              <a:gdLst/>
+              <a:ahLst/>
+              <a:cxnLst/>
+              <a:rect l="l" t="t" r="r" b="b"/>
+              <a:pathLst>
+                <a:path w="1913890" h="1913890">
+                  <a:moveTo>
+                    <a:pt x="0" y="0"/>
+                  </a:moveTo>
+                  <a:lnTo>
+                    <a:pt x="0" y="1913890"/>
+                  </a:lnTo>
+                  <a:lnTo>
+                    <a:pt x="1913890" y="1913890"/>
+                  </a:lnTo>
+                  <a:lnTo>
+                    <a:pt x="1913890" y="0"/>
+                  </a:lnTo>
+                  <a:lnTo>
+                    <a:pt x="0" y="0"/>
+                  </a:lnTo>
+                  <a:close/>
+                  <a:moveTo>
+                    <a:pt x="1852930" y="1852930"/>
+                  </a:moveTo>
+                  <a:lnTo>
+                    <a:pt x="59690" y="1852930"/>
+                  </a:lnTo>
+                  <a:lnTo>
+                    <a:pt x="59690" y="59690"/>
+                  </a:lnTo>
+                  <a:lnTo>
+                    <a:pt x="1852930" y="59690"/>
+                  </a:lnTo>
+                  <a:lnTo>
+                    <a:pt x="1852930" y="1852930"/>
+                  </a:lnTo>
+                  <a:close/>
+                </a:path>
+              </a:pathLst>
+            </a:custGeom>
+            <a:solidFill>
+              <a:srgbClr val="2B4A9D"/>
+            </a:solidFill>
+          </p:spPr>
+        </p:sp>
+      </p:grpSp>
+      <p:grpSp>
+        <p:nvGrpSpPr>
+          <p:cNvPr id="8" name="Group 8"/>
+          <p:cNvGrpSpPr/>
+          <p:nvPr/>
+        </p:nvGrpSpPr>
+        <p:grpSpPr>
+          <a:xfrm rot="2700000">
+            <a:off x="11143419" y="-3920369"/>
+            <a:ext cx="6164339" cy="6164339"/>
+            <a:chOff x="0" y="0"/>
+            <a:chExt cx="1913890" cy="1913890"/>
+          </a:xfrm>
+        </p:grpSpPr>
+        <p:sp>
+          <p:nvSpPr>
+            <p:cNvPr id="9" name="Freeform 9"/>
+            <p:cNvSpPr/>
+            <p:nvPr/>
+          </p:nvSpPr>
+          <p:spPr>
+            <a:xfrm>
+              <a:off x="0" y="0"/>
+              <a:ext cx="1913890" cy="1913890"/>
+            </a:xfrm>
+            <a:custGeom>
+              <a:avLst/>
+              <a:gdLst/>
+              <a:ahLst/>
+              <a:cxnLst/>
+              <a:rect l="l" t="t" r="r" b="b"/>
+              <a:pathLst>
+                <a:path w="1913890" h="1913890">
+                  <a:moveTo>
+                    <a:pt x="0" y="0"/>
+                  </a:moveTo>
+                  <a:lnTo>
+                    <a:pt x="0" y="1913890"/>
+                  </a:lnTo>
+                  <a:lnTo>
+                    <a:pt x="1913890" y="1913890"/>
+                  </a:lnTo>
+                  <a:lnTo>
+                    <a:pt x="1913890" y="0"/>
+                  </a:lnTo>
+                  <a:lnTo>
+                    <a:pt x="0" y="0"/>
+                  </a:lnTo>
+                  <a:close/>
+                  <a:moveTo>
+                    <a:pt x="1852930" y="1852930"/>
+                  </a:moveTo>
+                  <a:lnTo>
+                    <a:pt x="59690" y="1852930"/>
+                  </a:lnTo>
+                  <a:lnTo>
+                    <a:pt x="59690" y="59690"/>
+                  </a:lnTo>
+                  <a:lnTo>
+                    <a:pt x="1852930" y="59690"/>
+                  </a:lnTo>
+                  <a:lnTo>
+                    <a:pt x="1852930" y="1852930"/>
+                  </a:lnTo>
+                  <a:close/>
+                </a:path>
+              </a:pathLst>
+            </a:custGeom>
+            <a:solidFill>
+              <a:srgbClr val="2B4A9D"/>
+            </a:solidFill>
+          </p:spPr>
+        </p:sp>
+      </p:grpSp>
       <p:sp>
         <p:nvSpPr>
           <p:cNvPr id="13" name="TextBox 13"/>
@@ -5097,8 +5600,8 @@
         </p:nvSpPr>
         <p:spPr>
           <a:xfrm>
-            <a:off x="1028700" y="997398"/>
-            <a:ext cx="9135755" cy="1626471"/>
+            <a:off x="1404481" y="496357"/>
+            <a:ext cx="9135755" cy="1629292"/>
           </a:xfrm>
           <a:prstGeom prst="rect">
             <a:avLst/>
@@ -5116,12 +5619,505 @@
               </a:lnSpc>
             </a:pPr>
             <a:r>
+              <a:rPr lang="en-US" sz="6000" spc="300" dirty="0">
+                <a:solidFill>
+                  <a:srgbClr val="2B4A9D"/>
+                </a:solidFill>
+                <a:latin typeface="Poppins Ultra-Bold"/>
+              </a:rPr>
+              <a:t>Principal </a:t>
+            </a:r>
+            <a:r>
               <a:rPr lang="en-US" sz="6000" spc="300" dirty="0" err="1">
                 <a:solidFill>
                   <a:srgbClr val="2B4A9D"/>
                 </a:solidFill>
                 <a:latin typeface="Poppins Ultra-Bold"/>
               </a:rPr>
+              <a:t>ambiente</a:t>
+            </a:r>
+            <a:r>
+              <a:rPr lang="en-US" sz="6000" spc="300" dirty="0">
+                <a:solidFill>
+                  <a:srgbClr val="2B4A9D"/>
+                </a:solidFill>
+                <a:latin typeface="Poppins Ultra-Bold"/>
+              </a:rPr>
+              <a:t> de </a:t>
+            </a:r>
+            <a:r>
+              <a:rPr lang="en-US" sz="6000" spc="300" dirty="0" err="1">
+                <a:solidFill>
+                  <a:srgbClr val="2B4A9D"/>
+                </a:solidFill>
+                <a:latin typeface="Poppins Ultra-Bold"/>
+              </a:rPr>
+              <a:t>desenvolvimento</a:t>
+            </a:r>
+            <a:endParaRPr lang="en-US" sz="6000" spc="300" dirty="0">
+              <a:solidFill>
+                <a:srgbClr val="2B4A9D"/>
+              </a:solidFill>
+              <a:latin typeface="Poppins Ultra-Bold"/>
+              <a:cs typeface="Poppins Ultra-Bold"/>
+            </a:endParaRPr>
+          </a:p>
+        </p:txBody>
+      </p:sp>
+      <p:grpSp>
+        <p:nvGrpSpPr>
+          <p:cNvPr id="14" name="Group 14"/>
+          <p:cNvGrpSpPr/>
+          <p:nvPr/>
+        </p:nvGrpSpPr>
+        <p:grpSpPr>
+          <a:xfrm rot="5400000">
+            <a:off x="-1309" y="1309"/>
+            <a:ext cx="1635964" cy="1633346"/>
+            <a:chOff x="0" y="0"/>
+            <a:chExt cx="6350000" cy="6339840"/>
+          </a:xfrm>
+        </p:grpSpPr>
+        <p:sp>
+          <p:nvSpPr>
+            <p:cNvPr id="15" name="Freeform 15"/>
+            <p:cNvSpPr/>
+            <p:nvPr/>
+          </p:nvSpPr>
+          <p:spPr>
+            <a:xfrm>
+              <a:off x="0" y="0"/>
+              <a:ext cx="6350000" cy="6339840"/>
+            </a:xfrm>
+            <a:custGeom>
+              <a:avLst/>
+              <a:gdLst/>
+              <a:ahLst/>
+              <a:cxnLst/>
+              <a:rect l="l" t="t" r="r" b="b"/>
+              <a:pathLst>
+                <a:path w="6350000" h="6339840">
+                  <a:moveTo>
+                    <a:pt x="6350000" y="6339840"/>
+                  </a:moveTo>
+                  <a:lnTo>
+                    <a:pt x="0" y="6339840"/>
+                  </a:lnTo>
+                  <a:lnTo>
+                    <a:pt x="0" y="0"/>
+                  </a:lnTo>
+                  <a:lnTo>
+                    <a:pt x="6350000" y="6339840"/>
+                  </a:lnTo>
+                  <a:close/>
+                </a:path>
+              </a:pathLst>
+            </a:custGeom>
+            <a:solidFill>
+              <a:srgbClr val="2B4A9D"/>
+            </a:solidFill>
+          </p:spPr>
+        </p:sp>
+      </p:grpSp>
+      <p:sp>
+        <p:nvSpPr>
+          <p:cNvPr id="16" name="TextBox 16"/>
+          <p:cNvSpPr txBox="1"/>
+          <p:nvPr/>
+        </p:nvSpPr>
+        <p:spPr>
+          <a:xfrm>
+            <a:off x="1028700" y="2905957"/>
+            <a:ext cx="10184809" cy="5539978"/>
+          </a:xfrm>
+          <a:prstGeom prst="rect">
+            <a:avLst/>
+          </a:prstGeom>
+        </p:spPr>
+        <p:txBody>
+          <a:bodyPr wrap="square" lIns="0" tIns="0" rIns="0" bIns="0" rtlCol="0" anchor="t">
+            <a:spAutoFit/>
+          </a:bodyPr>
+          <a:lstStyle/>
+          <a:p>
+            <a:pPr algn="just"/>
+            <a:r>
+              <a:rPr lang="en-US" sz="4000" spc="339" dirty="0">
+                <a:solidFill>
+                  <a:srgbClr val="000000"/>
+                </a:solidFill>
+                <a:ea typeface="+mn-lt"/>
+                <a:cs typeface="+mn-lt"/>
+              </a:rPr>
+              <a:t>O Flutter SDK é o principal </a:t>
+            </a:r>
+            <a:r>
+              <a:rPr lang="en-US" sz="4000" spc="339" dirty="0" err="1">
+                <a:solidFill>
+                  <a:srgbClr val="000000"/>
+                </a:solidFill>
+                <a:ea typeface="+mn-lt"/>
+                <a:cs typeface="+mn-lt"/>
+              </a:rPr>
+              <a:t>ambiente</a:t>
+            </a:r>
+            <a:r>
+              <a:rPr lang="en-US" sz="4000" spc="339" dirty="0">
+                <a:solidFill>
+                  <a:srgbClr val="000000"/>
+                </a:solidFill>
+                <a:ea typeface="+mn-lt"/>
+                <a:cs typeface="+mn-lt"/>
+              </a:rPr>
+              <a:t> de </a:t>
+            </a:r>
+            <a:r>
+              <a:rPr lang="en-US" sz="4000" spc="339" dirty="0" err="1">
+                <a:solidFill>
+                  <a:srgbClr val="000000"/>
+                </a:solidFill>
+                <a:ea typeface="+mn-lt"/>
+                <a:cs typeface="+mn-lt"/>
+              </a:rPr>
+              <a:t>desenvolvimento</a:t>
+            </a:r>
+            <a:r>
+              <a:rPr lang="en-US" sz="4000" spc="339" dirty="0">
+                <a:solidFill>
+                  <a:srgbClr val="000000"/>
+                </a:solidFill>
+                <a:ea typeface="+mn-lt"/>
+                <a:cs typeface="+mn-lt"/>
+              </a:rPr>
+              <a:t> do Flutter, </a:t>
+            </a:r>
+            <a:r>
+              <a:rPr lang="en-US" sz="4000" spc="339" dirty="0" err="1">
+                <a:solidFill>
+                  <a:srgbClr val="000000"/>
+                </a:solidFill>
+                <a:ea typeface="+mn-lt"/>
+                <a:cs typeface="+mn-lt"/>
+              </a:rPr>
+              <a:t>integrando</a:t>
+            </a:r>
+            <a:r>
+              <a:rPr lang="en-US" sz="4000" spc="339" dirty="0">
+                <a:solidFill>
+                  <a:srgbClr val="000000"/>
+                </a:solidFill>
+                <a:ea typeface="+mn-lt"/>
+                <a:cs typeface="+mn-lt"/>
+              </a:rPr>
+              <a:t> o framework com widgets </a:t>
+            </a:r>
+            <a:r>
+              <a:rPr lang="en-US" sz="4000" spc="339" dirty="0" err="1">
+                <a:solidFill>
+                  <a:srgbClr val="000000"/>
+                </a:solidFill>
+                <a:ea typeface="+mn-lt"/>
+                <a:cs typeface="+mn-lt"/>
+              </a:rPr>
+              <a:t>nativos</a:t>
+            </a:r>
+            <a:r>
+              <a:rPr lang="en-US" sz="4000" spc="339" dirty="0">
+                <a:solidFill>
+                  <a:srgbClr val="000000"/>
+                </a:solidFill>
+                <a:ea typeface="+mn-lt"/>
+                <a:cs typeface="+mn-lt"/>
+              </a:rPr>
+              <a:t> e a </a:t>
+            </a:r>
+            <a:r>
+              <a:rPr lang="en-US" sz="4000" spc="339" dirty="0" err="1">
+                <a:solidFill>
+                  <a:srgbClr val="000000"/>
+                </a:solidFill>
+                <a:ea typeface="+mn-lt"/>
+                <a:cs typeface="+mn-lt"/>
+              </a:rPr>
+              <a:t>linguagem</a:t>
+            </a:r>
+            <a:r>
+              <a:rPr lang="en-US" sz="4000" spc="339" dirty="0">
+                <a:solidFill>
+                  <a:srgbClr val="000000"/>
+                </a:solidFill>
+                <a:ea typeface="+mn-lt"/>
+                <a:cs typeface="+mn-lt"/>
+              </a:rPr>
+              <a:t> Dart. </a:t>
+            </a:r>
+            <a:r>
+              <a:rPr lang="en-US" sz="4000" spc="339" dirty="0" err="1">
+                <a:solidFill>
+                  <a:srgbClr val="000000"/>
+                </a:solidFill>
+                <a:ea typeface="+mn-lt"/>
+                <a:cs typeface="+mn-lt"/>
+              </a:rPr>
+              <a:t>Compatível</a:t>
+            </a:r>
+            <a:r>
+              <a:rPr lang="en-US" sz="4000" spc="339" dirty="0">
+                <a:solidFill>
+                  <a:srgbClr val="000000"/>
+                </a:solidFill>
+                <a:ea typeface="+mn-lt"/>
+                <a:cs typeface="+mn-lt"/>
+              </a:rPr>
+              <a:t> com IDEs </a:t>
+            </a:r>
+            <a:r>
+              <a:rPr lang="en-US" sz="4000" spc="339" dirty="0" err="1">
+                <a:solidFill>
+                  <a:srgbClr val="000000"/>
+                </a:solidFill>
+                <a:ea typeface="+mn-lt"/>
+                <a:cs typeface="+mn-lt"/>
+              </a:rPr>
+              <a:t>como</a:t>
+            </a:r>
+            <a:r>
+              <a:rPr lang="en-US" sz="4000" spc="339" dirty="0">
+                <a:solidFill>
+                  <a:srgbClr val="000000"/>
+                </a:solidFill>
+                <a:ea typeface="+mn-lt"/>
+                <a:cs typeface="+mn-lt"/>
+              </a:rPr>
+              <a:t> Visual Studio Code e Android Studio, </a:t>
+            </a:r>
+            <a:r>
+              <a:rPr lang="en-US" sz="4000" spc="339" dirty="0" err="1">
+                <a:solidFill>
+                  <a:srgbClr val="000000"/>
+                </a:solidFill>
+                <a:ea typeface="+mn-lt"/>
+                <a:cs typeface="+mn-lt"/>
+              </a:rPr>
+              <a:t>oferece</a:t>
+            </a:r>
+            <a:r>
+              <a:rPr lang="en-US" sz="4000" spc="339" dirty="0">
+                <a:solidFill>
+                  <a:srgbClr val="000000"/>
+                </a:solidFill>
+                <a:ea typeface="+mn-lt"/>
+                <a:cs typeface="+mn-lt"/>
+              </a:rPr>
+              <a:t> ferramentas para </a:t>
+            </a:r>
+            <a:r>
+              <a:rPr lang="en-US" sz="4000" spc="339" dirty="0" err="1">
+                <a:solidFill>
+                  <a:srgbClr val="000000"/>
+                </a:solidFill>
+                <a:ea typeface="+mn-lt"/>
+                <a:cs typeface="+mn-lt"/>
+              </a:rPr>
+              <a:t>depuração</a:t>
+            </a:r>
+            <a:r>
+              <a:rPr lang="en-US" sz="4000" spc="339" dirty="0">
+                <a:solidFill>
+                  <a:srgbClr val="000000"/>
+                </a:solidFill>
+                <a:ea typeface="+mn-lt"/>
+                <a:cs typeface="+mn-lt"/>
+              </a:rPr>
+              <a:t> e </a:t>
+            </a:r>
+            <a:r>
+              <a:rPr lang="en-US" sz="4000" spc="339" dirty="0" err="1">
+                <a:solidFill>
+                  <a:srgbClr val="000000"/>
+                </a:solidFill>
+                <a:ea typeface="+mn-lt"/>
+                <a:cs typeface="+mn-lt"/>
+              </a:rPr>
+              <a:t>gerenciamento</a:t>
+            </a:r>
+            <a:r>
+              <a:rPr lang="en-US" sz="4000" spc="339" dirty="0">
+                <a:solidFill>
+                  <a:srgbClr val="000000"/>
+                </a:solidFill>
+                <a:ea typeface="+mn-lt"/>
+                <a:cs typeface="+mn-lt"/>
+              </a:rPr>
+              <a:t> de </a:t>
+            </a:r>
+            <a:r>
+              <a:rPr lang="en-US" sz="4000" spc="339" dirty="0" err="1">
+                <a:solidFill>
+                  <a:srgbClr val="000000"/>
+                </a:solidFill>
+                <a:ea typeface="+mn-lt"/>
+                <a:cs typeface="+mn-lt"/>
+              </a:rPr>
+              <a:t>pacotes</a:t>
+            </a:r>
+            <a:r>
+              <a:rPr lang="en-US" sz="4000" spc="339" dirty="0">
+                <a:solidFill>
+                  <a:srgbClr val="000000"/>
+                </a:solidFill>
+                <a:ea typeface="+mn-lt"/>
+                <a:cs typeface="+mn-lt"/>
+              </a:rPr>
+              <a:t>, </a:t>
+            </a:r>
+            <a:r>
+              <a:rPr lang="en-US" sz="4000" spc="339" dirty="0" err="1">
+                <a:solidFill>
+                  <a:srgbClr val="000000"/>
+                </a:solidFill>
+                <a:ea typeface="+mn-lt"/>
+                <a:cs typeface="+mn-lt"/>
+              </a:rPr>
+              <a:t>facilitando</a:t>
+            </a:r>
+            <a:r>
+              <a:rPr lang="en-US" sz="4000" spc="339" dirty="0">
+                <a:solidFill>
+                  <a:srgbClr val="000000"/>
+                </a:solidFill>
+                <a:ea typeface="+mn-lt"/>
+                <a:cs typeface="+mn-lt"/>
+              </a:rPr>
+              <a:t> a </a:t>
+            </a:r>
+            <a:r>
+              <a:rPr lang="en-US" sz="4000" spc="339" dirty="0" err="1">
+                <a:solidFill>
+                  <a:srgbClr val="000000"/>
+                </a:solidFill>
+                <a:ea typeface="+mn-lt"/>
+                <a:cs typeface="+mn-lt"/>
+              </a:rPr>
+              <a:t>criação</a:t>
+            </a:r>
+            <a:r>
+              <a:rPr lang="en-US" sz="4000" spc="339" dirty="0">
+                <a:solidFill>
+                  <a:srgbClr val="000000"/>
+                </a:solidFill>
+                <a:ea typeface="+mn-lt"/>
+                <a:cs typeface="+mn-lt"/>
+              </a:rPr>
+              <a:t> de </a:t>
+            </a:r>
+            <a:r>
+              <a:rPr lang="en-US" sz="4000" spc="339" dirty="0" err="1">
+                <a:solidFill>
+                  <a:srgbClr val="000000"/>
+                </a:solidFill>
+                <a:ea typeface="+mn-lt"/>
+                <a:cs typeface="+mn-lt"/>
+              </a:rPr>
+              <a:t>aplicativos</a:t>
+            </a:r>
+            <a:r>
+              <a:rPr lang="en-US" sz="4000" spc="339" dirty="0">
+                <a:solidFill>
+                  <a:srgbClr val="000000"/>
+                </a:solidFill>
+                <a:ea typeface="+mn-lt"/>
+                <a:cs typeface="+mn-lt"/>
+              </a:rPr>
+              <a:t> </a:t>
+            </a:r>
+            <a:r>
+              <a:rPr lang="en-US" sz="4000" spc="339" dirty="0" err="1">
+                <a:solidFill>
+                  <a:srgbClr val="000000"/>
+                </a:solidFill>
+                <a:ea typeface="+mn-lt"/>
+                <a:cs typeface="+mn-lt"/>
+              </a:rPr>
+              <a:t>multiplataforma</a:t>
+            </a:r>
+            <a:r>
+              <a:rPr lang="en-US" sz="4000" spc="339" dirty="0">
+                <a:solidFill>
+                  <a:srgbClr val="000000"/>
+                </a:solidFill>
+                <a:ea typeface="+mn-lt"/>
+                <a:cs typeface="+mn-lt"/>
+              </a:rPr>
+              <a:t>.</a:t>
+            </a:r>
+            <a:endParaRPr lang="pt-BR" dirty="0"/>
+          </a:p>
+        </p:txBody>
+      </p:sp>
+    </p:spTree>
+    <p:extLst>
+      <p:ext uri="{BB962C8B-B14F-4D97-AF65-F5344CB8AC3E}">
+        <p14:creationId xmlns:p14="http://schemas.microsoft.com/office/powerpoint/2010/main" val="1273341521"/>
+      </p:ext>
+    </p:extLst>
+  </p:cSld>
+  <p:clrMapOvr>
+    <a:masterClrMapping/>
+  </p:clrMapOvr>
+</p:sld>
+</file>
+
+<file path=ppt/slides/slide5.xml><?xml version="1.0" encoding="utf-8"?>
+<p:sld xmlns:a="http://schemas.openxmlformats.org/drawingml/2006/main" xmlns:r="http://schemas.openxmlformats.org/officeDocument/2006/relationships" xmlns:p="http://schemas.openxmlformats.org/presentationml/2006/main">
+  <p:cSld>
+    <p:spTree>
+      <p:nvGrpSpPr>
+        <p:cNvPr id="1" name=""/>
+        <p:cNvGrpSpPr/>
+        <p:nvPr/>
+      </p:nvGrpSpPr>
+      <p:grpSpPr>
+        <a:xfrm>
+          <a:off x="0" y="0"/>
+          <a:ext cx="0" cy="0"/>
+          <a:chOff x="0" y="0"/>
+          <a:chExt cx="0" cy="0"/>
+        </a:xfrm>
+      </p:grpSpPr>
+      <p:sp>
+        <p:nvSpPr>
+          <p:cNvPr id="13" name="TextBox 13"/>
+          <p:cNvSpPr txBox="1"/>
+          <p:nvPr/>
+        </p:nvSpPr>
+        <p:spPr>
+          <a:xfrm>
+            <a:off x="1999467" y="558987"/>
+            <a:ext cx="15085618" cy="1626471"/>
+          </a:xfrm>
+          <a:prstGeom prst="rect">
+            <a:avLst/>
+          </a:prstGeom>
+        </p:spPr>
+        <p:txBody>
+          <a:bodyPr wrap="square" lIns="0" tIns="0" rIns="0" bIns="0" rtlCol="0" anchor="t">
+            <a:spAutoFit/>
+          </a:bodyPr>
+          <a:lstStyle/>
+          <a:p>
+            <a:pPr algn="ctr">
+              <a:lnSpc>
+                <a:spcPts val="6300"/>
+              </a:lnSpc>
+            </a:pPr>
+            <a:r>
+              <a:rPr lang="en-US" sz="6000" spc="300" dirty="0" err="1">
+                <a:solidFill>
+                  <a:srgbClr val="2B4A9D"/>
+                </a:solidFill>
+                <a:latin typeface="Poppins Ultra-Bold"/>
+              </a:rPr>
               <a:t>Ambiente</a:t>
             </a:r>
             <a:r>
@@ -5141,6 +6137,60 @@
                 <a:latin typeface="Poppins Ultra-Bold"/>
               </a:rPr>
               <a:t>desenvolvimento</a:t>
+            </a:r>
+            <a:r>
+              <a:rPr lang="en-US" sz="6000" spc="300" dirty="0">
+                <a:solidFill>
+                  <a:srgbClr val="2B4A9D"/>
+                </a:solidFill>
+                <a:latin typeface="Poppins Ultra-Bold"/>
+              </a:rPr>
+              <a:t> </a:t>
+            </a:r>
+            <a:r>
+              <a:rPr lang="en-US" sz="6000" spc="300" dirty="0" err="1">
+                <a:solidFill>
+                  <a:srgbClr val="2B4A9D"/>
+                </a:solidFill>
+                <a:latin typeface="Poppins Ultra-Bold"/>
+              </a:rPr>
+              <a:t>utilizado</a:t>
+            </a:r>
+            <a:r>
+              <a:rPr lang="en-US" sz="6000" spc="300" dirty="0">
+                <a:solidFill>
+                  <a:srgbClr val="2B4A9D"/>
+                </a:solidFill>
+                <a:latin typeface="Poppins Ultra-Bold"/>
+              </a:rPr>
+              <a:t> </a:t>
+            </a:r>
+            <a:r>
+              <a:rPr lang="en-US" sz="6000" spc="300" dirty="0" err="1">
+                <a:solidFill>
+                  <a:srgbClr val="2B4A9D"/>
+                </a:solidFill>
+                <a:latin typeface="Poppins Ultra-Bold"/>
+              </a:rPr>
+              <a:t>neste</a:t>
+            </a:r>
+            <a:r>
+              <a:rPr lang="en-US" sz="6000" spc="300" dirty="0">
+                <a:solidFill>
+                  <a:srgbClr val="2B4A9D"/>
+                </a:solidFill>
+                <a:latin typeface="Poppins Ultra-Bold"/>
+              </a:rPr>
+              <a:t> </a:t>
+            </a:r>
+            <a:r>
+              <a:rPr lang="en-US" sz="6000" spc="300" dirty="0" err="1">
+                <a:solidFill>
+                  <a:srgbClr val="2B4A9D"/>
+                </a:solidFill>
+                <a:latin typeface="Poppins Ultra-Bold"/>
+              </a:rPr>
+              <a:t>curso</a:t>
             </a:r>
             <a:endParaRPr lang="pt-BR" dirty="0" err="1"/>
           </a:p>
@@ -5618,7 +6668,7 @@
 </p:sld>
 </file>
 
-<file path=ppt/slides/slide5.xml><?xml version="1.0" encoding="utf-8"?>
+<file path=ppt/slides/slide6.xml><?xml version="1.0" encoding="utf-8"?>
 <p:sld xmlns:a="http://schemas.openxmlformats.org/drawingml/2006/main" xmlns:r="http://schemas.openxmlformats.org/officeDocument/2006/relationships" xmlns:p="http://schemas.openxmlformats.org/presentationml/2006/main">
   <p:cSld>
     <p:spTree>
@@ -6185,7 +7235,7 @@
 </p:sld>
 </file>
 
-<file path=ppt/slides/slide6.xml><?xml version="1.0" encoding="utf-8"?>
+<file path=ppt/slides/slide7.xml><?xml version="1.0" encoding="utf-8"?>
 <p:sld xmlns:a="http://schemas.openxmlformats.org/drawingml/2006/main" xmlns:r="http://schemas.openxmlformats.org/officeDocument/2006/relationships" xmlns:p="http://schemas.openxmlformats.org/presentationml/2006/main">
   <p:cSld>
     <p:spTree>
@@ -6256,7 +7306,345 @@
 </p:sld>
 </file>
 
-<file path=ppt/slides/slide7.xml><?xml version="1.0" encoding="utf-8"?>
+<file path=ppt/slides/slide8.xml><?xml version="1.0" encoding="utf-8"?>
+<p:sld xmlns:a="http://schemas.openxmlformats.org/drawingml/2006/main" xmlns:r="http://schemas.openxmlformats.org/officeDocument/2006/relationships" xmlns:p="http://schemas.openxmlformats.org/presentationml/2006/main">
+  <p:cSld>
+    <p:spTree>
+      <p:nvGrpSpPr>
+        <p:cNvPr id="1" name=""/>
+        <p:cNvGrpSpPr/>
+        <p:nvPr/>
+      </p:nvGrpSpPr>
+      <p:grpSpPr>
+        <a:xfrm>
+          <a:off x="0" y="0"/>
+          <a:ext cx="0" cy="0"/>
+          <a:chOff x="0" y="0"/>
+          <a:chExt cx="0" cy="0"/>
+        </a:xfrm>
+      </p:grpSpPr>
+      <p:sp>
+        <p:nvSpPr>
+          <p:cNvPr id="2" name="TextBox 2"/>
+          <p:cNvSpPr txBox="1"/>
+          <p:nvPr/>
+        </p:nvSpPr>
+        <p:spPr>
+          <a:xfrm>
+            <a:off x="483222" y="2710115"/>
+            <a:ext cx="17315652" cy="1846659"/>
+          </a:xfrm>
+          <a:prstGeom prst="rect">
+            <a:avLst/>
+          </a:prstGeom>
+        </p:spPr>
+        <p:txBody>
+          <a:bodyPr lIns="0" tIns="0" rIns="0" bIns="0" rtlCol="0" anchor="t">
+            <a:spAutoFit/>
+          </a:bodyPr>
+          <a:lstStyle/>
+          <a:p>
+            <a:pPr marL="755650" indent="-377825" algn="just">
+              <a:buFont typeface="Arial"/>
+              <a:buChar char="•"/>
+            </a:pPr>
+            <a:r>
+              <a:rPr lang="en-US" sz="4000" b="1" spc="350" dirty="0">
+                <a:solidFill>
+                  <a:srgbClr val="000000"/>
+                </a:solidFill>
+                <a:latin typeface="Calibri"/>
+                <a:ea typeface="Lato"/>
+                <a:cs typeface="Lato"/>
+              </a:rPr>
+              <a:t>Flutter documentation.</a:t>
+            </a:r>
+            <a:r>
+              <a:rPr lang="en-US" sz="4000" spc="350" dirty="0">
+                <a:solidFill>
+                  <a:srgbClr val="000000"/>
+                </a:solidFill>
+                <a:latin typeface="Calibri"/>
+                <a:ea typeface="Lato"/>
+                <a:cs typeface="Lato"/>
+              </a:rPr>
+              <a:t> </a:t>
+            </a:r>
+            <a:r>
+              <a:rPr lang="en-US" sz="4000" spc="350" err="1">
+                <a:solidFill>
+                  <a:srgbClr val="000000"/>
+                </a:solidFill>
+                <a:latin typeface="Calibri"/>
+                <a:ea typeface="Lato"/>
+                <a:cs typeface="Lato"/>
+              </a:rPr>
+              <a:t>Disponível</a:t>
+            </a:r>
+            <a:r>
+              <a:rPr lang="en-US" sz="4000" spc="350" dirty="0">
+                <a:solidFill>
+                  <a:srgbClr val="000000"/>
+                </a:solidFill>
+                <a:latin typeface="Calibri"/>
+                <a:ea typeface="Lato"/>
+                <a:cs typeface="Lato"/>
+              </a:rPr>
+              <a:t> </a:t>
+            </a:r>
+            <a:r>
+              <a:rPr lang="en-US" sz="4000" spc="350" err="1">
+                <a:solidFill>
+                  <a:srgbClr val="000000"/>
+                </a:solidFill>
+                <a:latin typeface="Calibri"/>
+                <a:ea typeface="Lato"/>
+                <a:cs typeface="Lato"/>
+              </a:rPr>
+              <a:t>em</a:t>
+            </a:r>
+            <a:r>
+              <a:rPr lang="en-US" sz="4000" spc="350" dirty="0">
+                <a:solidFill>
+                  <a:srgbClr val="000000"/>
+                </a:solidFill>
+                <a:latin typeface="Calibri"/>
+                <a:ea typeface="Lato"/>
+                <a:cs typeface="Lato"/>
+              </a:rPr>
+              <a:t>: &lt;</a:t>
+            </a:r>
+            <a:r>
+              <a:rPr lang="en-US" sz="4000" spc="350" dirty="0">
+                <a:solidFill>
+                  <a:srgbClr val="000000"/>
+                </a:solidFill>
+                <a:latin typeface="Calibri"/>
+                <a:ea typeface="Lato"/>
+                <a:cs typeface="Lato"/>
+                <a:hlinkClick r:id="rId2"/>
+              </a:rPr>
+              <a:t>https://docs.flutter.dev/</a:t>
+            </a:r>
+            <a:r>
+              <a:rPr lang="en-US" sz="4000" spc="350" dirty="0">
+                <a:solidFill>
+                  <a:srgbClr val="000000"/>
+                </a:solidFill>
+                <a:latin typeface="Calibri"/>
+                <a:ea typeface="Lato"/>
+                <a:cs typeface="Lato"/>
+              </a:rPr>
+              <a:t>&gt;. </a:t>
+            </a:r>
+            <a:r>
+              <a:rPr lang="en-US" sz="4000" spc="350" err="1">
+                <a:solidFill>
+                  <a:srgbClr val="000000"/>
+                </a:solidFill>
+                <a:latin typeface="Calibri"/>
+                <a:ea typeface="Lato"/>
+                <a:cs typeface="Lato"/>
+              </a:rPr>
+              <a:t>Acesso</a:t>
+            </a:r>
+            <a:r>
+              <a:rPr lang="en-US" sz="4000" spc="350" dirty="0">
+                <a:solidFill>
+                  <a:srgbClr val="000000"/>
+                </a:solidFill>
+                <a:latin typeface="Calibri"/>
+                <a:ea typeface="Lato"/>
+                <a:cs typeface="Lato"/>
+              </a:rPr>
+              <a:t> </a:t>
+            </a:r>
+            <a:r>
+              <a:rPr lang="en-US" sz="4000" spc="350" err="1">
+                <a:solidFill>
+                  <a:srgbClr val="000000"/>
+                </a:solidFill>
+                <a:latin typeface="Calibri"/>
+                <a:ea typeface="Lato"/>
+                <a:cs typeface="Lato"/>
+              </a:rPr>
+              <a:t>em</a:t>
+            </a:r>
+            <a:r>
+              <a:rPr lang="en-US" sz="4000" spc="350" dirty="0">
+                <a:solidFill>
+                  <a:srgbClr val="000000"/>
+                </a:solidFill>
+                <a:latin typeface="Calibri"/>
+                <a:ea typeface="Lato"/>
+                <a:cs typeface="Lato"/>
+              </a:rPr>
+              <a:t>: 6 </a:t>
+            </a:r>
+            <a:r>
+              <a:rPr lang="en-US" sz="4000" spc="350" err="1">
+                <a:solidFill>
+                  <a:srgbClr val="000000"/>
+                </a:solidFill>
+                <a:latin typeface="Calibri"/>
+                <a:ea typeface="Lato"/>
+                <a:cs typeface="Lato"/>
+              </a:rPr>
+              <a:t>dez</a:t>
+            </a:r>
+            <a:r>
+              <a:rPr lang="en-US" sz="4000" spc="350" dirty="0">
+                <a:solidFill>
+                  <a:srgbClr val="000000"/>
+                </a:solidFill>
+                <a:latin typeface="Calibri"/>
+                <a:ea typeface="Lato"/>
+                <a:cs typeface="Lato"/>
+              </a:rPr>
+              <a:t>. 2024. </a:t>
+            </a:r>
+            <a:endParaRPr lang="en-US" dirty="0">
+              <a:latin typeface="Calibri"/>
+              <a:ea typeface="Calibri"/>
+              <a:cs typeface="Calibri"/>
+            </a:endParaRPr>
+          </a:p>
+          <a:p>
+            <a:pPr marL="755650" lvl="1" indent="-377825" algn="just">
+              <a:buFont typeface="Arial"/>
+              <a:buChar char="•"/>
+            </a:pPr>
+            <a:endParaRPr lang="en-US" sz="4000" spc="350" dirty="0">
+              <a:solidFill>
+                <a:srgbClr val="000000"/>
+              </a:solidFill>
+              <a:latin typeface="Lato"/>
+              <a:ea typeface="Lato"/>
+              <a:cs typeface="Lato"/>
+            </a:endParaRPr>
+          </a:p>
+        </p:txBody>
+      </p:sp>
+      <p:sp>
+        <p:nvSpPr>
+          <p:cNvPr id="3" name="TextBox 3"/>
+          <p:cNvSpPr txBox="1"/>
+          <p:nvPr/>
+        </p:nvSpPr>
+        <p:spPr>
+          <a:xfrm>
+            <a:off x="1536445" y="824329"/>
+            <a:ext cx="15223821" cy="667490"/>
+          </a:xfrm>
+          <a:prstGeom prst="rect">
+            <a:avLst/>
+          </a:prstGeom>
+        </p:spPr>
+        <p:txBody>
+          <a:bodyPr wrap="square" lIns="0" tIns="0" rIns="0" bIns="0" rtlCol="0" anchor="t">
+            <a:spAutoFit/>
+          </a:bodyPr>
+          <a:lstStyle/>
+          <a:p>
+            <a:pPr marL="485775" lvl="1" algn="ctr">
+              <a:lnSpc>
+                <a:spcPts val="4725"/>
+              </a:lnSpc>
+            </a:pPr>
+            <a:r>
+              <a:rPr lang="en-US" sz="6000" spc="225" dirty="0" err="1">
+                <a:solidFill>
+                  <a:srgbClr val="2B4A9D"/>
+                </a:solidFill>
+                <a:latin typeface="Poppins Ultra-Bold"/>
+                <a:cs typeface="Poppins Ultra-Bold"/>
+              </a:rPr>
+              <a:t>Referências</a:t>
+            </a:r>
+          </a:p>
+        </p:txBody>
+      </p:sp>
+      <p:grpSp>
+        <p:nvGrpSpPr>
+          <p:cNvPr id="6" name="Group 14">
+            <a:extLst>
+              <a:ext uri="{FF2B5EF4-FFF2-40B4-BE49-F238E27FC236}">
+                <a16:creationId xmlns:a16="http://schemas.microsoft.com/office/drawing/2014/main" id="{87B2F7C1-5599-10E5-1F33-EBF5683025E1}"/>
+              </a:ext>
+            </a:extLst>
+          </p:cNvPr>
+          <p:cNvGrpSpPr/>
+          <p:nvPr/>
+        </p:nvGrpSpPr>
+        <p:grpSpPr>
+          <a:xfrm rot="5400000">
+            <a:off x="-1309" y="1309"/>
+            <a:ext cx="1635964" cy="1633346"/>
+            <a:chOff x="0" y="0"/>
+            <a:chExt cx="6350000" cy="6339840"/>
+          </a:xfrm>
+        </p:grpSpPr>
+        <p:sp>
+          <p:nvSpPr>
+            <p:cNvPr id="5" name="Freeform 15">
+              <a:extLst>
+                <a:ext uri="{FF2B5EF4-FFF2-40B4-BE49-F238E27FC236}">
+                  <a16:creationId xmlns:a16="http://schemas.microsoft.com/office/drawing/2014/main" id="{18CD85D3-8141-2E3C-4081-E7F0981D5799}"/>
+                </a:ext>
+              </a:extLst>
+            </p:cNvPr>
+            <p:cNvSpPr/>
+            <p:nvPr/>
+          </p:nvSpPr>
+          <p:spPr>
+            <a:xfrm>
+              <a:off x="0" y="0"/>
+              <a:ext cx="6350000" cy="6339840"/>
+            </a:xfrm>
+            <a:custGeom>
+              <a:avLst/>
+              <a:gdLst/>
+              <a:ahLst/>
+              <a:cxnLst/>
+              <a:rect l="l" t="t" r="r" b="b"/>
+              <a:pathLst>
+                <a:path w="6350000" h="6339840">
+                  <a:moveTo>
+                    <a:pt x="6350000" y="6339840"/>
+                  </a:moveTo>
+                  <a:lnTo>
+                    <a:pt x="0" y="6339840"/>
+                  </a:lnTo>
+                  <a:lnTo>
+                    <a:pt x="0" y="0"/>
+                  </a:lnTo>
+                  <a:lnTo>
+                    <a:pt x="6350000" y="6339840"/>
+                  </a:lnTo>
+                  <a:close/>
+                </a:path>
+              </a:pathLst>
+            </a:custGeom>
+            <a:solidFill>
+              <a:srgbClr val="2B4A9D"/>
+            </a:solidFill>
+          </p:spPr>
+        </p:sp>
+      </p:grpSp>
+    </p:spTree>
+    <p:extLst>
+      <p:ext uri="{BB962C8B-B14F-4D97-AF65-F5344CB8AC3E}">
+        <p14:creationId xmlns:p14="http://schemas.microsoft.com/office/powerpoint/2010/main" val="1683375616"/>
+      </p:ext>
+    </p:extLst>
+  </p:cSld>
+  <p:clrMapOvr>
+    <a:masterClrMapping/>
+  </p:clrMapOvr>
+</p:sld>
+</file>
+
+<file path=ppt/slides/slide9.xml><?xml version="1.0" encoding="utf-8"?>
 <p:sld xmlns:a="http://schemas.openxmlformats.org/drawingml/2006/main" xmlns:r="http://schemas.openxmlformats.org/officeDocument/2006/relationships" xmlns:p="http://schemas.openxmlformats.org/presentationml/2006/main">
   <p:cSld>
     <p:spTree>
@@ -6281,7 +7669,7 @@
         </p:nvSpPr>
         <p:spPr>
           <a:xfrm>
-            <a:off x="1532135" y="4043865"/>
+            <a:off x="1532135" y="3325827"/>
             <a:ext cx="15223821" cy="2196948"/>
           </a:xfrm>
           <a:prstGeom prst="rect">

</xml_diff>